<commit_message>
Updated feedback survey link
</commit_message>
<xml_diff>
--- a/Introduction to Fortran Slides.pptx
+++ b/Introduction to Fortran Slides.pptx
@@ -486,7 +486,7 @@
           <a:p>
             <a:fld id="{88EB714B-C3CC-4216-88C1-02913905B1CF}" type="datetimeFigureOut">
               <a:rPr lang="en-GB" smtClean="0"/>
-              <a:t>20/05/2021</a:t>
+              <a:t>04/10/2021</a:t>
             </a:fld>
             <a:endParaRPr lang="en-GB"/>
           </a:p>
@@ -8523,7 +8523,7 @@
           <a:p>
             <a:fld id="{EB0080F8-EA1C-491D-963C-2C881B2F918F}" type="datetimeFigureOut">
               <a:rPr lang="en-GB" smtClean="0"/>
-              <a:t>20/05/2021</a:t>
+              <a:t>04/10/2021</a:t>
             </a:fld>
             <a:endParaRPr lang="en-GB"/>
           </a:p>
@@ -8673,7 +8673,7 @@
           <a:p>
             <a:fld id="{EB0080F8-EA1C-491D-963C-2C881B2F918F}" type="datetimeFigureOut">
               <a:rPr lang="en-GB" smtClean="0"/>
-              <a:t>20/05/2021</a:t>
+              <a:t>04/10/2021</a:t>
             </a:fld>
             <a:endParaRPr lang="en-GB"/>
           </a:p>
@@ -10206,7 +10206,7 @@
           <a:p>
             <a:fld id="{EB0080F8-EA1C-491D-963C-2C881B2F918F}" type="datetimeFigureOut">
               <a:rPr lang="en-GB" smtClean="0"/>
-              <a:t>20/05/2021</a:t>
+              <a:t>04/10/2021</a:t>
             </a:fld>
             <a:endParaRPr lang="en-GB"/>
           </a:p>
@@ -10683,7 +10683,15 @@
           <a:p>
             <a:r>
               <a:rPr lang="en-GB" sz="2400" dirty="0"/>
-              <a:t>Graduate School Teaching Fellow</a:t>
+              <a:t>Graduate </a:t>
+            </a:r>
+            <a:r>
+              <a:rPr lang="en-GB" sz="2400"/>
+              <a:t>School Senior Teaching </a:t>
+            </a:r>
+            <a:r>
+              <a:rPr lang="en-GB" sz="2400" dirty="0"/>
+              <a:t>Fellow</a:t>
             </a:r>
           </a:p>
         </p:txBody>
@@ -24765,16 +24773,25 @@
               <a:t>The link is </a:t>
             </a:r>
             <a:r>
-              <a:rPr lang="en-GB" sz="2600" b="0" i="0" u="sng" dirty="0">
-                <a:solidFill>
-                  <a:srgbClr val="954F72"/>
+              <a:rPr lang="en-GB" sz="2600" u="sng" dirty="0">
+                <a:solidFill>
+                  <a:srgbClr val="000000"/>
                 </a:solidFill>
                 <a:effectLst/>
+                <a:latin typeface="+mj-lt"/>
+                <a:ea typeface="Times New Roman" panose="02020603050405020304" pitchFamily="18" charset="0"/>
                 <a:hlinkClick r:id="rId3"/>
               </a:rPr>
-              <a:t>http://bit.ly/rcds2021</a:t>
-            </a:r>
-            <a:endParaRPr lang="en-GB" sz="2600" dirty="0"/>
+              <a:t>tinyurl.com/rcds2021-22</a:t>
+            </a:r>
+            <a:endParaRPr lang="en-GB" sz="2600" u="sng" dirty="0">
+              <a:solidFill>
+                <a:srgbClr val="000000"/>
+              </a:solidFill>
+              <a:effectLst/>
+              <a:latin typeface="+mj-lt"/>
+              <a:ea typeface="Times New Roman" panose="02020603050405020304" pitchFamily="18" charset="0"/>
+            </a:endParaRPr>
           </a:p>
           <a:p>
             <a:pPr lvl="1"/>

</xml_diff>